<commit_message>
updating ppoint and changing name
</commit_message>
<xml_diff>
--- a/Healthcare_Data_Clustering.pptx
+++ b/Healthcare_Data_Clustering.pptx
@@ -134,6 +134,7 @@
 <p1510:revInfo xmlns:a="http://schemas.openxmlformats.org/drawingml/2006/main" xmlns:r="http://schemas.openxmlformats.org/officeDocument/2006/relationships" xmlns:p1510="http://schemas.microsoft.com/office/powerpoint/2015/10/main">
   <p1510:revLst>
     <p1510:client id="{0A214270-0B91-F980-3D88-B77251D30209}" v="596" dt="2021-02-05T03:01:38.026"/>
+    <p1510:client id="{30A7CFC7-4F0E-6F9A-A844-77BA96167B13}" v="800" dt="2021-02-19T00:30:32.284"/>
     <p1510:client id="{6968BB08-C688-401F-829D-C2D618576954}" v="1178" dt="2021-01-09T01:54:09.844"/>
     <p1510:client id="{6AD55515-08E0-691C-3F08-60694AFEB0B9}" v="1440" dt="2021-02-04T03:30:40.189"/>
     <p1510:client id="{7FF283C4-CAEE-F1D8-2CA7-1A7D45B04FB1}" v="236" dt="2021-02-04T08:57:27.909"/>
@@ -955,6 +956,100 @@
             <ac:picMk id="10" creationId="{8D787ED0-AAC2-4869-9125-F6526C1CE003}"/>
           </ac:picMkLst>
         </pc:picChg>
+      </pc:sldChg>
+    </pc:docChg>
+  </pc:docChgLst>
+  <pc:docChgLst>
+    <pc:chgData name="Galaviz, Michael" userId="S::mgalaviz1@live.maryville.edu::652b4b54-1f36-424e-bd7f-d49d5101e64c" providerId="AD" clId="Web-{30A7CFC7-4F0E-6F9A-A844-77BA96167B13}"/>
+    <pc:docChg chg="modSld">
+      <pc:chgData name="Galaviz, Michael" userId="S::mgalaviz1@live.maryville.edu::652b4b54-1f36-424e-bd7f-d49d5101e64c" providerId="AD" clId="Web-{30A7CFC7-4F0E-6F9A-A844-77BA96167B13}" dt="2021-02-19T00:30:11.049" v="425" actId="20577"/>
+      <pc:docMkLst>
+        <pc:docMk/>
+      </pc:docMkLst>
+      <pc:sldChg chg="modSp">
+        <pc:chgData name="Galaviz, Michael" userId="S::mgalaviz1@live.maryville.edu::652b4b54-1f36-424e-bd7f-d49d5101e64c" providerId="AD" clId="Web-{30A7CFC7-4F0E-6F9A-A844-77BA96167B13}" dt="2021-02-19T00:12:22.977" v="43" actId="14100"/>
+        <pc:sldMkLst>
+          <pc:docMk/>
+          <pc:sldMk cId="2024207241" sldId="271"/>
+        </pc:sldMkLst>
+        <pc:spChg chg="mod">
+          <ac:chgData name="Galaviz, Michael" userId="S::mgalaviz1@live.maryville.edu::652b4b54-1f36-424e-bd7f-d49d5101e64c" providerId="AD" clId="Web-{30A7CFC7-4F0E-6F9A-A844-77BA96167B13}" dt="2021-02-19T00:12:22.977" v="43" actId="14100"/>
+          <ac:spMkLst>
+            <pc:docMk/>
+            <pc:sldMk cId="2024207241" sldId="271"/>
+            <ac:spMk id="20" creationId="{4D3A3257-B1EA-45AC-AF59-22F1146A8C9F}"/>
+          </ac:spMkLst>
+        </pc:spChg>
+      </pc:sldChg>
+      <pc:sldChg chg="modSp">
+        <pc:chgData name="Galaviz, Michael" userId="S::mgalaviz1@live.maryville.edu::652b4b54-1f36-424e-bd7f-d49d5101e64c" providerId="AD" clId="Web-{30A7CFC7-4F0E-6F9A-A844-77BA96167B13}" dt="2021-02-19T00:30:11.049" v="425" actId="20577"/>
+        <pc:sldMkLst>
+          <pc:docMk/>
+          <pc:sldMk cId="3218704433" sldId="275"/>
+        </pc:sldMkLst>
+        <pc:spChg chg="mod">
+          <ac:chgData name="Galaviz, Michael" userId="S::mgalaviz1@live.maryville.edu::652b4b54-1f36-424e-bd7f-d49d5101e64c" providerId="AD" clId="Web-{30A7CFC7-4F0E-6F9A-A844-77BA96167B13}" dt="2021-02-19T00:26:37.106" v="307" actId="20577"/>
+          <ac:spMkLst>
+            <pc:docMk/>
+            <pc:sldMk cId="3218704433" sldId="275"/>
+            <ac:spMk id="4" creationId="{733F3737-8825-43CD-BD8E-C9A9F2A94012}"/>
+          </ac:spMkLst>
+        </pc:spChg>
+        <pc:spChg chg="mod">
+          <ac:chgData name="Galaviz, Michael" userId="S::mgalaviz1@live.maryville.edu::652b4b54-1f36-424e-bd7f-d49d5101e64c" providerId="AD" clId="Web-{30A7CFC7-4F0E-6F9A-A844-77BA96167B13}" dt="2021-02-19T00:29:40.845" v="408" actId="20577"/>
+          <ac:spMkLst>
+            <pc:docMk/>
+            <pc:sldMk cId="3218704433" sldId="275"/>
+            <ac:spMk id="6" creationId="{3303B60D-0833-4C0A-B766-B29C9313C354}"/>
+          </ac:spMkLst>
+        </pc:spChg>
+        <pc:spChg chg="mod">
+          <ac:chgData name="Galaviz, Michael" userId="S::mgalaviz1@live.maryville.edu::652b4b54-1f36-424e-bd7f-d49d5101e64c" providerId="AD" clId="Web-{30A7CFC7-4F0E-6F9A-A844-77BA96167B13}" dt="2021-02-19T00:30:11.049" v="425" actId="20577"/>
+          <ac:spMkLst>
+            <pc:docMk/>
+            <pc:sldMk cId="3218704433" sldId="275"/>
+            <ac:spMk id="8" creationId="{058C9DBB-3A47-454C-B1BF-F520685F331E}"/>
+          </ac:spMkLst>
+        </pc:spChg>
+      </pc:sldChg>
+      <pc:sldChg chg="modSp">
+        <pc:chgData name="Galaviz, Michael" userId="S::mgalaviz1@live.maryville.edu::652b4b54-1f36-424e-bd7f-d49d5101e64c" providerId="AD" clId="Web-{30A7CFC7-4F0E-6F9A-A844-77BA96167B13}" dt="2021-02-19T00:21:19.193" v="181" actId="20577"/>
+        <pc:sldMkLst>
+          <pc:docMk/>
+          <pc:sldMk cId="107369582" sldId="278"/>
+        </pc:sldMkLst>
+        <pc:spChg chg="mod">
+          <ac:chgData name="Galaviz, Michael" userId="S::mgalaviz1@live.maryville.edu::652b4b54-1f36-424e-bd7f-d49d5101e64c" providerId="AD" clId="Web-{30A7CFC7-4F0E-6F9A-A844-77BA96167B13}" dt="2021-02-19T00:19:41.128" v="167" actId="20577"/>
+          <ac:spMkLst>
+            <pc:docMk/>
+            <pc:sldMk cId="107369582" sldId="278"/>
+            <ac:spMk id="4" creationId="{A03BB5B3-ADBE-40C7-A732-D1B088ACAA9A}"/>
+          </ac:spMkLst>
+        </pc:spChg>
+        <pc:spChg chg="mod">
+          <ac:chgData name="Galaviz, Michael" userId="S::mgalaviz1@live.maryville.edu::652b4b54-1f36-424e-bd7f-d49d5101e64c" providerId="AD" clId="Web-{30A7CFC7-4F0E-6F9A-A844-77BA96167B13}" dt="2021-02-19T00:17:44" v="108" actId="20577"/>
+          <ac:spMkLst>
+            <pc:docMk/>
+            <pc:sldMk cId="107369582" sldId="278"/>
+            <ac:spMk id="6" creationId="{95357567-A3E1-4733-85E3-835A0535A395}"/>
+          </ac:spMkLst>
+        </pc:spChg>
+        <pc:spChg chg="mod">
+          <ac:chgData name="Galaviz, Michael" userId="S::mgalaviz1@live.maryville.edu::652b4b54-1f36-424e-bd7f-d49d5101e64c" providerId="AD" clId="Web-{30A7CFC7-4F0E-6F9A-A844-77BA96167B13}" dt="2021-02-19T00:20:25.410" v="178" actId="20577"/>
+          <ac:spMkLst>
+            <pc:docMk/>
+            <pc:sldMk cId="107369582" sldId="278"/>
+            <ac:spMk id="7" creationId="{85F5C2EC-EFDA-4E10-9C22-37E9DDF1805A}"/>
+          </ac:spMkLst>
+        </pc:spChg>
+        <pc:spChg chg="mod">
+          <ac:chgData name="Galaviz, Michael" userId="S::mgalaviz1@live.maryville.edu::652b4b54-1f36-424e-bd7f-d49d5101e64c" providerId="AD" clId="Web-{30A7CFC7-4F0E-6F9A-A844-77BA96167B13}" dt="2021-02-19T00:21:19.193" v="181" actId="20577"/>
+          <ac:spMkLst>
+            <pc:docMk/>
+            <pc:sldMk cId="107369582" sldId="278"/>
+            <ac:spMk id="8" creationId="{450B8931-09DC-495E-9725-04D6E464DC2E}"/>
+          </ac:spMkLst>
+        </pc:spChg>
       </pc:sldChg>
     </pc:docChg>
   </pc:docChgLst>
@@ -5398,6 +5493,13 @@
     <dgm:pt modelId="{16300106-7D3B-41A5-9476-84870BE144C9}">
       <dgm:prSet phldr="0"/>
       <dgm:spPr/>
+      <dgm:t>
+        <a:bodyPr/>
+        <a:lstStyle/>
+        <a:p>
+          <a:endParaRPr lang="en-US"/>
+        </a:p>
+      </dgm:t>
     </dgm:pt>
     <dgm:pt modelId="{E218C36A-C176-4FE4-A552-F448983E91E4}" type="parTrans" cxnId="{1D32EDAB-8DF1-4D6A-8E03-9C58C8613FE9}">
       <dgm:prSet/>
@@ -16919,7 +17021,7 @@
           <a:p>
             <a:fld id="{A73A7868-BE2B-4818-85C7-EB052CEB0E64}" type="datetimeFigureOut">
               <a:rPr lang="en-US" smtClean="0"/>
-              <a:t>2/4/2021</a:t>
+              <a:t>2/18/2021</a:t>
             </a:fld>
             <a:endParaRPr lang="en-US"/>
           </a:p>
@@ -17958,7 +18060,7 @@
             <a:fld id="{D200B3F0-A9BC-48CE-8EB6-ECE965069900}" type="datetimeFigureOut">
               <a:rPr lang="en-US" dirty="0"/>
               <a:pPr/>
-              <a:t>2/4/2021</a:t>
+              <a:t>2/18/2021</a:t>
             </a:fld>
             <a:endParaRPr lang="en-US"/>
           </a:p>
@@ -19113,7 +19215,7 @@
           <a:p>
             <a:fld id="{3DF9FFFF-3106-4DDB-AA62-0C80862170D6}" type="datetimeFigureOut">
               <a:rPr lang="en-US" dirty="0"/>
-              <a:t>2/4/2021</a:t>
+              <a:t>2/18/2021</a:t>
             </a:fld>
             <a:endParaRPr lang="en-US"/>
           </a:p>
@@ -20162,7 +20264,7 @@
           <a:p>
             <a:fld id="{A3DA38B7-AE95-4DC8-9A51-7A71F545B098}" type="datetimeFigureOut">
               <a:rPr lang="en-US" dirty="0"/>
-              <a:t>2/4/2021</a:t>
+              <a:t>2/18/2021</a:t>
             </a:fld>
             <a:endParaRPr lang="en-US"/>
           </a:p>
@@ -21370,7 +21472,7 @@
           <a:p>
             <a:fld id="{86F1EC2B-8188-4AC2-9F0D-8D09C51D505A}" type="datetimeFigureOut">
               <a:rPr lang="en-US" dirty="0"/>
-              <a:t>2/4/2021</a:t>
+              <a:t>2/18/2021</a:t>
             </a:fld>
             <a:endParaRPr lang="en-US"/>
           </a:p>
@@ -22469,7 +22571,7 @@
           <a:p>
             <a:fld id="{9212B75E-944F-430B-BE5F-C69FA8823C04}" type="datetimeFigureOut">
               <a:rPr lang="en-US" dirty="0"/>
-              <a:t>2/4/2021</a:t>
+              <a:t>2/18/2021</a:t>
             </a:fld>
             <a:endParaRPr lang="en-US"/>
           </a:p>
@@ -23116,7 +23218,7 @@
           <a:p>
             <a:fld id="{79AE0DC7-7F53-471C-A711-B3DA6F2535F3}" type="datetimeFigureOut">
               <a:rPr lang="en-US" dirty="0"/>
-              <a:t>2/4/2021</a:t>
+              <a:t>2/18/2021</a:t>
             </a:fld>
             <a:endParaRPr lang="en-US"/>
           </a:p>
@@ -23955,7 +24057,7 @@
           <a:p>
             <a:fld id="{3C1F4C9D-4618-451D-80C1-6A376BB42AB4}" type="datetimeFigureOut">
               <a:rPr lang="en-US" dirty="0"/>
-              <a:t>2/4/2021</a:t>
+              <a:t>2/18/2021</a:t>
             </a:fld>
             <a:endParaRPr lang="en-US"/>
           </a:p>
@@ -24134,7 +24236,7 @@
           <a:p>
             <a:fld id="{F54D2318-CE40-42F6-962A-4C6D6CF697DB}" type="datetimeFigureOut">
               <a:rPr lang="en-US" dirty="0"/>
-              <a:t>2/4/2021</a:t>
+              <a:t>2/18/2021</a:t>
             </a:fld>
             <a:endParaRPr lang="en-US"/>
           </a:p>
@@ -25169,7 +25271,7 @@
           <a:p>
             <a:fld id="{0C476AC1-EB7F-4BEF-90D9-5764B50DAF8A}" type="datetimeFigureOut">
               <a:rPr lang="en-US" dirty="0"/>
-              <a:t>2/4/2021</a:t>
+              <a:t>2/18/2021</a:t>
             </a:fld>
             <a:endParaRPr lang="en-US"/>
           </a:p>
@@ -25379,7 +25481,7 @@
           <a:p>
             <a:fld id="{1B20712A-F861-4AB0-A754-4F5A2033CD4B}" type="datetimeFigureOut">
               <a:rPr lang="en-US" dirty="0"/>
-              <a:t>2/4/2021</a:t>
+              <a:t>2/18/2021</a:t>
             </a:fld>
             <a:endParaRPr lang="en-US"/>
           </a:p>
@@ -26479,7 +26581,7 @@
           <a:p>
             <a:fld id="{324507B7-F2DC-4B2C-B14D-58A9766807A2}" type="datetimeFigureOut">
               <a:rPr lang="en-US" dirty="0"/>
-              <a:t>2/4/2021</a:t>
+              <a:t>2/18/2021</a:t>
             </a:fld>
             <a:endParaRPr lang="en-US"/>
           </a:p>
@@ -26744,7 +26846,7 @@
           <a:p>
             <a:fld id="{904A483D-5CB4-4842-8F2F-05D5276ACF63}" type="datetimeFigureOut">
               <a:rPr lang="en-US" dirty="0"/>
-              <a:t>2/4/2021</a:t>
+              <a:t>2/18/2021</a:t>
             </a:fld>
             <a:endParaRPr lang="en-US"/>
           </a:p>
@@ -27119,7 +27221,7 @@
           <a:p>
             <a:fld id="{1D1CE32E-9DC0-47C8-A657-48F5C3E4A10B}" type="datetimeFigureOut">
               <a:rPr lang="en-US" dirty="0"/>
-              <a:t>2/4/2021</a:t>
+              <a:t>2/18/2021</a:t>
             </a:fld>
             <a:endParaRPr lang="en-US"/>
           </a:p>
@@ -27232,7 +27334,7 @@
           <a:p>
             <a:fld id="{2BDF5C0D-8C3A-4771-A43D-83937FC700D4}" type="datetimeFigureOut">
               <a:rPr lang="en-US" dirty="0"/>
-              <a:t>2/4/2021</a:t>
+              <a:t>2/18/2021</a:t>
             </a:fld>
             <a:endParaRPr lang="en-US"/>
           </a:p>
@@ -27323,7 +27425,7 @@
           <a:p>
             <a:fld id="{0203D2D6-FCC2-425A-A4A7-8058E8C01CB1}" type="datetimeFigureOut">
               <a:rPr lang="en-US" dirty="0"/>
-              <a:t>2/4/2021</a:t>
+              <a:t>2/18/2021</a:t>
             </a:fld>
             <a:endParaRPr lang="en-US"/>
           </a:p>
@@ -28469,7 +28571,7 @@
           <a:p>
             <a:fld id="{D8CF2683-E6E7-4CC3-9EEE-7854DD4F3545}" type="datetimeFigureOut">
               <a:rPr lang="en-US" dirty="0"/>
-              <a:t>2/4/2021</a:t>
+              <a:t>2/18/2021</a:t>
             </a:fld>
             <a:endParaRPr lang="en-US"/>
           </a:p>
@@ -29639,7 +29741,7 @@
           <a:p>
             <a:fld id="{7E120F81-B39D-4CBB-8BF3-5D6E395D0F72}" type="datetimeFigureOut">
               <a:rPr lang="en-US" dirty="0"/>
-              <a:t>2/4/2021</a:t>
+              <a:t>2/18/2021</a:t>
             </a:fld>
             <a:endParaRPr lang="en-US"/>
           </a:p>
@@ -30739,7 +30841,7 @@
           <a:p>
             <a:fld id="{564B320A-89BA-47B2-A525-92E8D10B06E4}" type="datetimeFigureOut">
               <a:rPr lang="en-US" dirty="0"/>
-              <a:t>2/4/2021</a:t>
+              <a:t>2/18/2021</a:t>
             </a:fld>
             <a:endParaRPr lang="en-US"/>
           </a:p>
@@ -33763,7 +33865,25 @@
                 <a:ea typeface="+mn-lt"/>
                 <a:cs typeface="+mn-lt"/>
               </a:rPr>
-              <a:t>Comparing the clusters resulting from 4 different clustering models above revealed that more clusters revealed more information or patterns but with less confidence. High confidence in the accuracy of cluster membership did not reveal anything new or interesting while clusters with low membership or low confidence revealed some groups that appear to get a high return on their investment in healthcare spending.</a:t>
+              <a:t>Using more clusters often returned more information or patterns but with less confidence in accuracy. </a:t>
+            </a:r>
+          </a:p>
+          <a:p>
+            <a:r>
+              <a:rPr lang="en-US" dirty="0">
+                <a:ea typeface="+mn-lt"/>
+                <a:cs typeface="+mn-lt"/>
+              </a:rPr>
+              <a:t>High confidence in the accuracy of cluster membership did not reveal anything new or interesting.</a:t>
+            </a:r>
+          </a:p>
+          <a:p>
+            <a:r>
+              <a:rPr lang="en-US" dirty="0">
+                <a:ea typeface="+mn-lt"/>
+                <a:cs typeface="+mn-lt"/>
+              </a:rPr>
+              <a:t>Clusters with low membership and low confidence revealed some groups that appear to get a high return on their investment in healthcare spending like Japan.</a:t>
             </a:r>
             <a:endParaRPr lang="en-US" dirty="0"/>
           </a:p>
@@ -33825,9 +33945,22 @@
           <a:p>
             <a:r>
               <a:rPr lang="en-US" dirty="0"/>
-              <a:t>Clusters in the dataset were high varied and not symmetrical suggesting that either too much data is missing or that the data points are not easily separable by the models used here. Testing the models with various parameters did not reveal new information but it often revealed useless information. The number of clusters I determined to be best was based on a conceivable number of clusters such as 4 or 5 that would give some interesting information but lacking somewhat in the confidence of new data belonging to that cluster.</a:t>
+              <a:t>Clusters were high varied and not symmetrical suggesting that too much data is missing or that the data points are not easily separable by the models used here.</a:t>
             </a:r>
-            <a:endParaRPr lang="en-US" dirty="0">
+          </a:p>
+          <a:p>
+            <a:r>
+              <a:rPr lang="en-US" dirty="0"/>
+              <a:t>Testing the models with various parameters did not reveal new information </a:t>
+            </a:r>
+            <a:endParaRPr lang="en-US"/>
+          </a:p>
+          <a:p>
+            <a:r>
+              <a:rPr lang="en-US" dirty="0"/>
+              <a:t>The number of clusters determined to be best was based on a conceivable number of clusters such as 4 or 5 that would give some interesting information but lacking somewhat in the confidence of new data belonging to that cluster.</a:t>
+            </a:r>
+            <a:endParaRPr lang="en-US">
               <a:ea typeface="+mn-lt"/>
               <a:cs typeface="+mn-lt"/>
             </a:endParaRPr>
@@ -33860,7 +33993,7 @@
           <a:p>
             <a:r>
               <a:rPr lang="en-US" dirty="0"/>
-              <a:t>Hierarchical Revealed more useful information.</a:t>
+              <a:t>Hierarchical was best.</a:t>
             </a:r>
           </a:p>
         </p:txBody>
@@ -33890,7 +34023,13 @@
           <a:p>
             <a:r>
               <a:rPr lang="en-US" dirty="0"/>
-              <a:t>Clusters resulting from K-Means gave us high confidence in their membership but relatively little useful information except when looking at k=6 which revealed high metrics with very low spending which may be quite useful. Clustering with DBSCAN returned the least confident scores and interesting clusters but with extremely low confidence that descriptions are really accurate.</a:t>
+              <a:t>Clusters resulting from K-Means gave us high confidence in their membership but relatively little useful information except when looking at k=6 which revealed high metrics with very low spending which may be quite useful. </a:t>
+            </a:r>
+          </a:p>
+          <a:p>
+            <a:r>
+              <a:rPr lang="en-US" dirty="0"/>
+              <a:t>Clustering with DBSCAN returned the least confident scores and interesting clusters but with extremely low confidence that descriptions are accurate.</a:t>
             </a:r>
             <a:endParaRPr lang="en-US" dirty="0">
               <a:ea typeface="+mn-lt"/>
@@ -34016,8 +34155,32 @@
                 <a:ea typeface="+mn-lt"/>
                 <a:cs typeface="+mn-lt"/>
               </a:rPr>
-              <a:t>As stated, complete data from all countries during the period studied may prove useful. Barring that, further testing using more categorical data and models using mixed data may reveal more as well. I did not include the Year and Country, both categorical data, because I was interested in comparing across the Country and be able to bring certain stakeholders from certain countries to the table to collaborate and inform policy at OECD.</a:t>
+              <a:t>Complete data from all countries during the period studied may prove useful. </a:t>
             </a:r>
+            <a:endParaRPr lang="en-US"/>
+          </a:p>
+          <a:p>
+            <a:r>
+              <a:rPr lang="en-US" dirty="0">
+                <a:ea typeface="+mn-lt"/>
+                <a:cs typeface="+mn-lt"/>
+              </a:rPr>
+              <a:t>Further testing using categorical data and models using mixed data may reveal more as well. </a:t>
+            </a:r>
+            <a:endParaRPr lang="en-US">
+              <a:ea typeface="+mn-lt"/>
+              <a:cs typeface="+mn-lt"/>
+            </a:endParaRPr>
+          </a:p>
+          <a:p>
+            <a:r>
+              <a:rPr lang="en-US" dirty="0">
+                <a:ea typeface="+mn-lt"/>
+                <a:cs typeface="+mn-lt"/>
+              </a:rPr>
+              <a:t>The Year and Country, both categorical features, were not analyzed because focus was on comparing across these features in order to inform policies and bring multiple stakeholders from specific countries to the table.</a:t>
+            </a:r>
+            <a:endParaRPr lang="en-US" dirty="0"/>
           </a:p>
         </p:txBody>
       </p:sp>
@@ -34068,7 +34231,7 @@
         <p:spPr/>
         <p:txBody>
           <a:bodyPr>
-            <a:normAutofit lnSpcReduction="10000"/>
+            <a:normAutofit/>
           </a:bodyPr>
           <a:lstStyle/>
           <a:p>
@@ -34077,7 +34240,7 @@
                 <a:ea typeface="+mn-lt"/>
                 <a:cs typeface="+mn-lt"/>
               </a:rPr>
-              <a:t>Japan stands out as having low spending but high metrics such as units and beds but also high hospital stays. While decreasing length of hospital stay is generally considered a positive trend, it may not be the case in countries where median age is increasing and may suggest that Japan's healthcare infrastructure is quite healthy. Of course, more data would be needed to explore this in more detail.</a:t>
+              <a:t>Japan stands out as having low spending but high metrics such as units and beds but also high hospital stays. While decreasing length of hospital stay is generally considered a positive trend, it may not be the case. Because of Japan's increasing median age, increased hospital stay may indicate infrastructure is quite healthy. More data &amp; analysis to test this is required. </a:t>
             </a:r>
           </a:p>
         </p:txBody>
@@ -34136,7 +34299,7 @@
                 <a:ea typeface="+mn-lt"/>
                 <a:cs typeface="+mn-lt"/>
               </a:rPr>
-              <a:t>Hierarchical clustering returned the best results with medium level confidence and tended to confirm the high hospital stay rate with low spending that should be investigated more. Clusters also confirmed high spending with very low metrics suggesting a low ROI in healthcare spending on those countries.</a:t>
+              <a:t>Hierarchical clustering returned the best results with medium level confidence and tended to confirm the high hospital stay rate with low spending that should be investigated more. Clusters also confirmed high spending with very low metrics suggesting a low ROI in healthcare spending on those countries. Most countries did not fully report data so these results are questionable. </a:t>
             </a:r>
             <a:endParaRPr lang="en-US" dirty="0"/>
           </a:p>
@@ -39882,8 +40045,8 @@
         </p:nvSpPr>
         <p:spPr>
           <a:xfrm>
-            <a:off x="8196440" y="1241266"/>
-            <a:ext cx="3346631" cy="3153753"/>
+            <a:off x="8307743" y="1891963"/>
+            <a:ext cx="3346631" cy="3753078"/>
           </a:xfrm>
           <a:prstGeom prst="rect">
             <a:avLst/>
@@ -39891,7 +40054,7 @@
         </p:spPr>
         <p:txBody>
           <a:bodyPr vert="horz" lIns="91440" tIns="45720" rIns="91440" bIns="45720" rtlCol="0" anchor="b">
-            <a:normAutofit fontScale="92500"/>
+            <a:normAutofit/>
           </a:bodyPr>
           <a:lstStyle/>
           <a:p>
@@ -39907,7 +40070,7 @@
               </a:spcAft>
             </a:pPr>
             <a:r>
-              <a:rPr lang="en-US" sz="5400" dirty="0">
+              <a:rPr lang="en-US" sz="2000" dirty="0">
                 <a:solidFill>
                   <a:schemeClr val="bg2"/>
                 </a:solidFill>
@@ -39917,6 +40080,105 @@
               </a:rPr>
               <a:t>Hospital stays tend to decrease.</a:t>
             </a:r>
+          </a:p>
+          <a:p>
+            <a:pPr>
+              <a:lnSpc>
+                <a:spcPct val="90000"/>
+              </a:lnSpc>
+              <a:spcBef>
+                <a:spcPct val="0"/>
+              </a:spcBef>
+              <a:spcAft>
+                <a:spcPts val="600"/>
+              </a:spcAft>
+            </a:pPr>
+            <a:endParaRPr lang="en-US" sz="2000" dirty="0">
+              <a:solidFill>
+                <a:schemeClr val="bg2"/>
+              </a:solidFill>
+              <a:ea typeface="+mj-ea"/>
+              <a:cs typeface="+mj-cs"/>
+            </a:endParaRPr>
+          </a:p>
+          <a:p>
+            <a:pPr>
+              <a:lnSpc>
+                <a:spcPct val="90000"/>
+              </a:lnSpc>
+              <a:spcBef>
+                <a:spcPct val="0"/>
+              </a:spcBef>
+              <a:spcAft>
+                <a:spcPts val="600"/>
+              </a:spcAft>
+            </a:pPr>
+            <a:r>
+              <a:rPr lang="en-US" sz="2000" dirty="0">
+                <a:solidFill>
+                  <a:schemeClr val="bg2"/>
+                </a:solidFill>
+                <a:ea typeface="+mj-ea"/>
+                <a:cs typeface="+mj-cs"/>
+              </a:rPr>
+              <a:t>Much less variability in recent years.</a:t>
+            </a:r>
+          </a:p>
+          <a:p>
+            <a:pPr>
+              <a:lnSpc>
+                <a:spcPct val="90000"/>
+              </a:lnSpc>
+              <a:spcBef>
+                <a:spcPct val="0"/>
+              </a:spcBef>
+              <a:spcAft>
+                <a:spcPts val="600"/>
+              </a:spcAft>
+            </a:pPr>
+            <a:endParaRPr lang="en-US" sz="2000" dirty="0">
+              <a:solidFill>
+                <a:schemeClr val="bg2"/>
+              </a:solidFill>
+              <a:ea typeface="+mj-ea"/>
+              <a:cs typeface="+mj-cs"/>
+            </a:endParaRPr>
+          </a:p>
+          <a:p>
+            <a:pPr>
+              <a:lnSpc>
+                <a:spcPct val="90000"/>
+              </a:lnSpc>
+              <a:spcBef>
+                <a:spcPct val="0"/>
+              </a:spcBef>
+              <a:spcAft>
+                <a:spcPts val="600"/>
+              </a:spcAft>
+            </a:pPr>
+            <a:r>
+              <a:rPr lang="en-US" sz="2000" dirty="0">
+                <a:solidFill>
+                  <a:schemeClr val="bg2"/>
+                </a:solidFill>
+                <a:ea typeface="+mj-ea"/>
+                <a:cs typeface="+mj-cs"/>
+              </a:rPr>
+              <a:t>Japan has much greater average hospital stays.</a:t>
+            </a:r>
+          </a:p>
+          <a:p>
+            <a:pPr>
+              <a:lnSpc>
+                <a:spcPct val="90000"/>
+              </a:lnSpc>
+              <a:spcBef>
+                <a:spcPct val="0"/>
+              </a:spcBef>
+              <a:spcAft>
+                <a:spcPts val="600"/>
+              </a:spcAft>
+            </a:pPr>
             <a:endParaRPr lang="en-US" sz="5400" dirty="0">
               <a:solidFill>
                 <a:schemeClr val="bg2"/>
@@ -42832,24 +43094,6 @@
 </file>
 
 <file path=customXml/item1.xml><?xml version="1.0" encoding="utf-8"?>
-<p:properties xmlns:p="http://schemas.microsoft.com/office/2006/metadata/properties" xmlns:xsi="http://www.w3.org/2001/XMLSchema-instance" xmlns:pc="http://schemas.microsoft.com/office/infopath/2007/PartnerControls">
-  <documentManagement>
-    <_ip_UnifiedCompliancePolicyUIAction xmlns="http://schemas.microsoft.com/sharepoint/v3" xsi:nil="true"/>
-    <_ip_UnifiedCompliancePolicyProperties xmlns="http://schemas.microsoft.com/sharepoint/v3" xsi:nil="true"/>
-  </documentManagement>
-</p:properties>
-</file>
-
-<file path=customXml/item2.xml><?xml version="1.0" encoding="utf-8"?>
-<?mso-contentType ?>
-<FormTemplates xmlns="http://schemas.microsoft.com/sharepoint/v3/contenttype/forms">
-  <Display>DocumentLibraryForm</Display>
-  <Edit>DocumentLibraryForm</Edit>
-  <New>DocumentLibraryForm</New>
-</FormTemplates>
-</file>
-
-<file path=customXml/item3.xml><?xml version="1.0" encoding="utf-8"?>
 <ct:contentTypeSchema xmlns:ct="http://schemas.microsoft.com/office/2006/metadata/contentType" xmlns:ma="http://schemas.microsoft.com/office/2006/metadata/properties/metaAttributes" ct:_="" ma:_="" ma:contentTypeName="Document" ma:contentTypeID="0x010100E09517786F0D704FBF20BE55443F9E94" ma:contentTypeVersion="11" ma:contentTypeDescription="Create a new document." ma:contentTypeScope="" ma:versionID="9688b6ec6d11f8018339c00b43710a22">
   <xsd:schema xmlns:xsd="http://www.w3.org/2001/XMLSchema" xmlns:xs="http://www.w3.org/2001/XMLSchema" xmlns:p="http://schemas.microsoft.com/office/2006/metadata/properties" xmlns:ns1="http://schemas.microsoft.com/sharepoint/v3" xmlns:ns3="432fa3b2-3203-4ff8-99db-3d58ebaced9f" targetNamespace="http://schemas.microsoft.com/office/2006/metadata/properties" ma:root="true" ma:fieldsID="5d14e6ecc266d3a339347298096b7da8" ns1:_="" ns3:_="">
     <xsd:import namespace="http://schemas.microsoft.com/sharepoint/v3"/>
@@ -43044,32 +43288,25 @@
 </ct:contentTypeSchema>
 </file>
 
-<file path=customXml/itemProps1.xml><?xml version="1.0" encoding="utf-8"?>
-<ds:datastoreItem xmlns:ds="http://schemas.openxmlformats.org/officeDocument/2006/customXml" ds:itemID="{6017DA68-7976-4C66-A725-C1E6A2F6B8E4}">
-  <ds:schemaRefs>
-    <ds:schemaRef ds:uri="432fa3b2-3203-4ff8-99db-3d58ebaced9f"/>
-    <ds:schemaRef ds:uri="http://purl.org/dc/dcmitype/"/>
-    <ds:schemaRef ds:uri="http://purl.org/dc/elements/1.1/"/>
-    <ds:schemaRef ds:uri="http://purl.org/dc/terms/"/>
-    <ds:schemaRef ds:uri="http://schemas.microsoft.com/office/2006/documentManagement/types"/>
-    <ds:schemaRef ds:uri="http://schemas.microsoft.com/office/2006/metadata/properties"/>
-    <ds:schemaRef ds:uri="http://schemas.microsoft.com/office/infopath/2007/PartnerControls"/>
-    <ds:schemaRef ds:uri="http://schemas.microsoft.com/sharepoint/v3"/>
-    <ds:schemaRef ds:uri="http://schemas.openxmlformats.org/package/2006/metadata/core-properties"/>
-    <ds:schemaRef ds:uri="http://www.w3.org/XML/1998/namespace"/>
-  </ds:schemaRefs>
-</ds:datastoreItem>
+<file path=customXml/item2.xml><?xml version="1.0" encoding="utf-8"?>
+<?mso-contentType ?>
+<FormTemplates xmlns="http://schemas.microsoft.com/sharepoint/v3/contenttype/forms">
+  <Display>DocumentLibraryForm</Display>
+  <Edit>DocumentLibraryForm</Edit>
+  <New>DocumentLibraryForm</New>
+</FormTemplates>
 </file>
 
-<file path=customXml/itemProps2.xml><?xml version="1.0" encoding="utf-8"?>
-<ds:datastoreItem xmlns:ds="http://schemas.openxmlformats.org/officeDocument/2006/customXml" ds:itemID="{712B4B56-0820-4AA6-B94C-9F35D9570448}">
-  <ds:schemaRefs>
-    <ds:schemaRef ds:uri="http://schemas.microsoft.com/sharepoint/v3/contenttype/forms"/>
-  </ds:schemaRefs>
-</ds:datastoreItem>
+<file path=customXml/item3.xml><?xml version="1.0" encoding="utf-8"?>
+<p:properties xmlns:p="http://schemas.microsoft.com/office/2006/metadata/properties" xmlns:xsi="http://www.w3.org/2001/XMLSchema-instance" xmlns:pc="http://schemas.microsoft.com/office/infopath/2007/PartnerControls">
+  <documentManagement>
+    <_ip_UnifiedCompliancePolicyUIAction xmlns="http://schemas.microsoft.com/sharepoint/v3" xsi:nil="true"/>
+    <_ip_UnifiedCompliancePolicyProperties xmlns="http://schemas.microsoft.com/sharepoint/v3" xsi:nil="true"/>
+  </documentManagement>
+</p:properties>
 </file>
 
-<file path=customXml/itemProps3.xml><?xml version="1.0" encoding="utf-8"?>
+<file path=customXml/itemProps1.xml><?xml version="1.0" encoding="utf-8"?>
 <ds:datastoreItem xmlns:ds="http://schemas.openxmlformats.org/officeDocument/2006/customXml" ds:itemID="{BE5C3BA5-3886-49AE-BC29-7F1A0E5A427B}">
   <ds:schemaRefs>
     <ds:schemaRef ds:uri="432fa3b2-3203-4ff8-99db-3d58ebaced9f"/>
@@ -43086,4 +43323,29 @@
     <ds:schemaRef ds:uri="http://www.w3.org/2001/XMLSchema"/>
   </ds:schemaRefs>
 </ds:datastoreItem>
+</file>
+
+<file path=customXml/itemProps2.xml><?xml version="1.0" encoding="utf-8"?>
+<ds:datastoreItem xmlns:ds="http://schemas.openxmlformats.org/officeDocument/2006/customXml" ds:itemID="{712B4B56-0820-4AA6-B94C-9F35D9570448}">
+  <ds:schemaRefs>
+    <ds:schemaRef ds:uri="http://schemas.microsoft.com/sharepoint/v3/contenttype/forms"/>
+  </ds:schemaRefs>
+</ds:datastoreItem>
+</file>
+
+<file path=customXml/itemProps3.xml><?xml version="1.0" encoding="utf-8"?>
+<ds:datastoreItem xmlns:ds="http://schemas.openxmlformats.org/officeDocument/2006/customXml" ds:itemID="{6017DA68-7976-4C66-A725-C1E6A2F6B8E4}">
+  <ds:schemaRefs>
+    <ds:schemaRef ds:uri="432fa3b2-3203-4ff8-99db-3d58ebaced9f"/>
+    <ds:schemaRef ds:uri="http://purl.org/dc/dcmitype/"/>
+    <ds:schemaRef ds:uri="http://purl.org/dc/elements/1.1/"/>
+    <ds:schemaRef ds:uri="http://purl.org/dc/terms/"/>
+    <ds:schemaRef ds:uri="http://schemas.microsoft.com/office/2006/documentManagement/types"/>
+    <ds:schemaRef ds:uri="http://schemas.microsoft.com/office/2006/metadata/properties"/>
+    <ds:schemaRef ds:uri="http://schemas.microsoft.com/office/infopath/2007/PartnerControls"/>
+    <ds:schemaRef ds:uri="http://schemas.microsoft.com/sharepoint/v3"/>
+    <ds:schemaRef ds:uri="http://schemas.openxmlformats.org/package/2006/metadata/core-properties"/>
+    <ds:schemaRef ds:uri="http://www.w3.org/XML/1998/namespace"/>
+  </ds:schemaRefs>
+</ds:datastoreItem>
 </file>
</xml_diff>